<commit_message>
Slides for tokens and react
</commit_message>
<xml_diff>
--- a/Dotnet/dotnet Session 2.pptx
+++ b/Dotnet/dotnet Session 2.pptx
@@ -31838,7 +31838,7 @@
           <a:p>
             <a:fld id="{C2E97FD6-B269-4CD7-A073-512C01108090}" type="datetimeFigureOut">
               <a:rPr lang="fr-FR" smtClean="0"/>
-              <a:t>27/09/2023</a:t>
+              <a:t>28/09/2023</a:t>
             </a:fld>
             <a:endParaRPr lang="fr-FR"/>
           </a:p>
@@ -32046,7 +32046,7 @@
           <a:p>
             <a:fld id="{C2E97FD6-B269-4CD7-A073-512C01108090}" type="datetimeFigureOut">
               <a:rPr lang="fr-FR" smtClean="0"/>
-              <a:t>27/09/2023</a:t>
+              <a:t>28/09/2023</a:t>
             </a:fld>
             <a:endParaRPr lang="fr-FR"/>
           </a:p>
@@ -32302,7 +32302,7 @@
           <a:p>
             <a:fld id="{C2E97FD6-B269-4CD7-A073-512C01108090}" type="datetimeFigureOut">
               <a:rPr lang="fr-FR" smtClean="0"/>
-              <a:t>27/09/2023</a:t>
+              <a:t>28/09/2023</a:t>
             </a:fld>
             <a:endParaRPr lang="fr-FR"/>
           </a:p>
@@ -32472,7 +32472,7 @@
           <a:p>
             <a:fld id="{C2E97FD6-B269-4CD7-A073-512C01108090}" type="datetimeFigureOut">
               <a:rPr lang="fr-FR" smtClean="0"/>
-              <a:t>27/09/2023</a:t>
+              <a:t>28/09/2023</a:t>
             </a:fld>
             <a:endParaRPr lang="fr-FR"/>
           </a:p>
@@ -32815,7 +32815,7 @@
           <a:p>
             <a:fld id="{C2E97FD6-B269-4CD7-A073-512C01108090}" type="datetimeFigureOut">
               <a:rPr lang="fr-FR" smtClean="0"/>
-              <a:t>27/09/2023</a:t>
+              <a:t>28/09/2023</a:t>
             </a:fld>
             <a:endParaRPr lang="fr-FR"/>
           </a:p>
@@ -33090,7 +33090,7 @@
           <a:p>
             <a:fld id="{C2E97FD6-B269-4CD7-A073-512C01108090}" type="datetimeFigureOut">
               <a:rPr lang="fr-FR" smtClean="0"/>
-              <a:t>27/09/2023</a:t>
+              <a:t>28/09/2023</a:t>
             </a:fld>
             <a:endParaRPr lang="fr-FR"/>
           </a:p>
@@ -33469,7 +33469,7 @@
           <a:p>
             <a:fld id="{C2E97FD6-B269-4CD7-A073-512C01108090}" type="datetimeFigureOut">
               <a:rPr lang="fr-FR" smtClean="0"/>
-              <a:t>27/09/2023</a:t>
+              <a:t>28/09/2023</a:t>
             </a:fld>
             <a:endParaRPr lang="fr-FR"/>
           </a:p>
@@ -33587,7 +33587,7 @@
           <a:p>
             <a:fld id="{C2E97FD6-B269-4CD7-A073-512C01108090}" type="datetimeFigureOut">
               <a:rPr lang="fr-FR" smtClean="0"/>
-              <a:t>27/09/2023</a:t>
+              <a:t>28/09/2023</a:t>
             </a:fld>
             <a:endParaRPr lang="fr-FR"/>
           </a:p>
@@ -33758,7 +33758,7 @@
           <a:p>
             <a:fld id="{C2E97FD6-B269-4CD7-A073-512C01108090}" type="datetimeFigureOut">
               <a:rPr lang="fr-FR" smtClean="0"/>
-              <a:t>27/09/2023</a:t>
+              <a:t>28/09/2023</a:t>
             </a:fld>
             <a:endParaRPr lang="fr-FR"/>
           </a:p>
@@ -34112,7 +34112,7 @@
           <a:p>
             <a:fld id="{C2E97FD6-B269-4CD7-A073-512C01108090}" type="datetimeFigureOut">
               <a:rPr lang="fr-FR" smtClean="0"/>
-              <a:t>27/09/2023</a:t>
+              <a:t>28/09/2023</a:t>
             </a:fld>
             <a:endParaRPr lang="fr-FR"/>
           </a:p>
@@ -34489,7 +34489,7 @@
           <a:p>
             <a:fld id="{C2E97FD6-B269-4CD7-A073-512C01108090}" type="datetimeFigureOut">
               <a:rPr lang="fr-FR" smtClean="0"/>
-              <a:t>27/09/2023</a:t>
+              <a:t>28/09/2023</a:t>
             </a:fld>
             <a:endParaRPr lang="fr-FR"/>
           </a:p>
@@ -34776,7 +34776,7 @@
           <a:p>
             <a:fld id="{C2E97FD6-B269-4CD7-A073-512C01108090}" type="datetimeFigureOut">
               <a:rPr lang="fr-FR" smtClean="0"/>
-              <a:t>27/09/2023</a:t>
+              <a:t>28/09/2023</a:t>
             </a:fld>
             <a:endParaRPr lang="fr-FR"/>
           </a:p>
@@ -35566,7 +35566,7 @@
           <a:p>
             <a:r>
               <a:rPr lang="en-GB" dirty="0"/>
-              <a:t>Create a User API Controller continued</a:t>
+              <a:t>Create a User API Controller - Admin</a:t>
             </a:r>
             <a:endParaRPr lang="fr-FR" dirty="0"/>
           </a:p>
@@ -35743,7 +35743,7 @@
           <a:p>
             <a:r>
               <a:rPr lang="en-GB" dirty="0"/>
-              <a:t>Create a User API Controller continued</a:t>
+              <a:t>Create a User API Controller - Login</a:t>
             </a:r>
             <a:endParaRPr lang="fr-FR" dirty="0"/>
           </a:p>
@@ -35920,7 +35920,7 @@
           <a:p>
             <a:r>
               <a:rPr lang="en-GB" dirty="0"/>
-              <a:t>Create a User API Controller continued</a:t>
+              <a:t>Create a User API Controller - Register</a:t>
             </a:r>
             <a:endParaRPr lang="fr-FR" dirty="0"/>
           </a:p>

</xml_diff>